<commit_message>
Incomplete - task : Linktables and Cascade
git-svn-id: https://mxunit.googlecode.com/svn/mxunit-cfmeetups@1723 f92dd5c0-c831-0410-92f9-1b6876b37263
</commit_message>
<xml_diff>
--- a/CFObjective_ORMZen/preso/orm_zen.ppt.pptx
+++ b/CFObjective_ORMZen/preso/orm_zen.ppt.pptx
@@ -1981,7 +1981,7 @@
           <a:p>
             <a:fld id="{8D079CED-E0C8-4B3D-AB1E-914A2D354D81}" type="datetimeFigureOut">
               <a:rPr lang="en-US" smtClean="0"/>
-              <a:t>4/17/2011</a:t>
+              <a:t>5/5/2011</a:t>
             </a:fld>
             <a:endParaRPr lang="en-US"/>
           </a:p>
@@ -2162,7 +2162,7 @@
           <a:p>
             <a:fld id="{8D079CED-E0C8-4B3D-AB1E-914A2D354D81}" type="datetimeFigureOut">
               <a:rPr lang="en-US" smtClean="0"/>
-              <a:t>4/17/2011</a:t>
+              <a:t>5/5/2011</a:t>
             </a:fld>
             <a:endParaRPr lang="en-US"/>
           </a:p>
@@ -2313,7 +2313,7 @@
           <a:p>
             <a:fld id="{8D079CED-E0C8-4B3D-AB1E-914A2D354D81}" type="datetimeFigureOut">
               <a:rPr lang="en-US" smtClean="0"/>
-              <a:t>4/17/2011</a:t>
+              <a:t>5/5/2011</a:t>
             </a:fld>
             <a:endParaRPr lang="en-US"/>
           </a:p>
@@ -4139,7 +4139,7 @@
           <a:p>
             <a:fld id="{8D079CED-E0C8-4B3D-AB1E-914A2D354D81}" type="datetimeFigureOut">
               <a:rPr lang="en-US" smtClean="0"/>
-              <a:t>4/17/2011</a:t>
+              <a:t>5/5/2011</a:t>
             </a:fld>
             <a:endParaRPr lang="en-US"/>
           </a:p>
@@ -6009,7 +6009,7 @@
           <a:p>
             <a:fld id="{8D079CED-E0C8-4B3D-AB1E-914A2D354D81}" type="datetimeFigureOut">
               <a:rPr lang="en-US" smtClean="0"/>
-              <a:t>4/17/2011</a:t>
+              <a:t>5/5/2011</a:t>
             </a:fld>
             <a:endParaRPr lang="en-US"/>
           </a:p>
@@ -6122,7 +6122,7 @@
           <a:p>
             <a:fld id="{8D079CED-E0C8-4B3D-AB1E-914A2D354D81}" type="datetimeFigureOut">
               <a:rPr lang="en-US" smtClean="0"/>
-              <a:t>4/17/2011</a:t>
+              <a:t>5/5/2011</a:t>
             </a:fld>
             <a:endParaRPr lang="en-US"/>
           </a:p>
@@ -6663,7 +6663,7 @@
           <a:p>
             <a:fld id="{8D079CED-E0C8-4B3D-AB1E-914A2D354D81}" type="datetimeFigureOut">
               <a:rPr lang="en-US" smtClean="0"/>
-              <a:t>4/17/2011</a:t>
+              <a:t>5/5/2011</a:t>
             </a:fld>
             <a:endParaRPr lang="en-US"/>
           </a:p>
@@ -6776,7 +6776,7 @@
           <a:p>
             <a:fld id="{8D079CED-E0C8-4B3D-AB1E-914A2D354D81}" type="datetimeFigureOut">
               <a:rPr lang="en-US" smtClean="0"/>
-              <a:t>4/17/2011</a:t>
+              <a:t>5/5/2011</a:t>
             </a:fld>
             <a:endParaRPr lang="en-US"/>
           </a:p>
@@ -8487,7 +8487,7 @@
           <a:p>
             <a:fld id="{8D079CED-E0C8-4B3D-AB1E-914A2D354D81}" type="datetimeFigureOut">
               <a:rPr lang="en-US" smtClean="0"/>
-              <a:t>4/17/2011</a:t>
+              <a:t>5/5/2011</a:t>
             </a:fld>
             <a:endParaRPr lang="en-US"/>
           </a:p>
@@ -8638,7 +8638,7 @@
           <a:p>
             <a:fld id="{8D079CED-E0C8-4B3D-AB1E-914A2D354D81}" type="datetimeFigureOut">
               <a:rPr lang="en-US" smtClean="0"/>
-              <a:t>4/17/2011</a:t>
+              <a:t>5/5/2011</a:t>
             </a:fld>
             <a:endParaRPr lang="en-US"/>
           </a:p>
@@ -12253,7 +12253,7 @@
           <a:p>
             <a:fld id="{8D079CED-E0C8-4B3D-AB1E-914A2D354D81}" type="datetimeFigureOut">
               <a:rPr lang="en-US" smtClean="0"/>
-              <a:t>4/17/2011</a:t>
+              <a:t>5/5/2011</a:t>
             </a:fld>
             <a:endParaRPr lang="en-US"/>
           </a:p>
@@ -14112,7 +14112,7 @@
           <a:p>
             <a:fld id="{8D079CED-E0C8-4B3D-AB1E-914A2D354D81}" type="datetimeFigureOut">
               <a:rPr lang="en-US" smtClean="0"/>
-              <a:t>4/17/2011</a:t>
+              <a:t>5/5/2011</a:t>
             </a:fld>
             <a:endParaRPr lang="en-US"/>
           </a:p>
@@ -16890,15 +16890,7 @@
           <a:p>
             <a:r>
               <a:rPr lang="en-US" dirty="0" smtClean="0"/>
-              <a:t>This </a:t>
-            </a:r>
-            <a:r>
-              <a:rPr lang="en-US" b="1" dirty="0" smtClean="0"/>
-              <a:t>simply</a:t>
-            </a:r>
-            <a:r>
-              <a:rPr lang="en-US" dirty="0" smtClean="0"/>
-              <a:t> means that you have to wrap </a:t>
+              <a:t>This means that you have to wrap </a:t>
             </a:r>
             <a:r>
               <a:rPr lang="en-US" dirty="0" err="1" smtClean="0"/>
@@ -16916,7 +16908,39 @@
               <a:rPr lang="en-US" dirty="0" smtClean="0"/>
               <a:t>() in transactions</a:t>
             </a:r>
+          </a:p>
+          <a:p>
+            <a:pPr lvl="1"/>
+            <a:r>
+              <a:rPr lang="en-US" dirty="0" smtClean="0"/>
+              <a:t>or use </a:t>
+            </a:r>
+            <a:r>
+              <a:rPr lang="en-US" dirty="0" err="1" smtClean="0"/>
+              <a:t>ormFlush</a:t>
+            </a:r>
+            <a:r>
+              <a:rPr lang="en-US" dirty="0" smtClean="0"/>
+              <a:t>()</a:t>
+            </a:r>
+          </a:p>
+          <a:p>
             <a:endParaRPr lang="en-US" dirty="0"/>
+          </a:p>
+          <a:p>
+            <a:r>
+              <a:rPr lang="en-US" sz="1800" dirty="0" smtClean="0"/>
+              <a:t>(Some would say you should wrap </a:t>
+            </a:r>
+            <a:r>
+              <a:rPr lang="en-US" sz="1800" b="1" dirty="0" smtClean="0"/>
+              <a:t>ALL</a:t>
+            </a:r>
+            <a:r>
+              <a:rPr lang="en-US" sz="1800" dirty="0" smtClean="0"/>
+              <a:t> state mutation in a transaction)</a:t>
+            </a:r>
+            <a:endParaRPr lang="en-US" sz="1800" dirty="0"/>
           </a:p>
         </p:txBody>
       </p:sp>
@@ -18112,11 +18136,7 @@
             <a:pPr lvl="1"/>
             <a:r>
               <a:rPr lang="en-US" dirty="0" smtClean="0"/>
-              <a:t>You’re setting a simple value when it expects </a:t>
-            </a:r>
-            <a:r>
-              <a:rPr lang="en-US" smtClean="0"/>
-              <a:t>an object</a:t>
+              <a:t>You’re setting a simple value when it expects an object</a:t>
             </a:r>
             <a:endParaRPr lang="en-US" dirty="0"/>
           </a:p>
@@ -18149,7 +18169,15 @@
             </a:r>
             <a:r>
               <a:rPr lang="en-US" dirty="0" smtClean="0"/>
-              <a:t>(“null”,”) );</a:t>
+              <a:t>(“null</a:t>
+            </a:r>
+            <a:r>
+              <a:rPr lang="en-US" dirty="0"/>
+              <a:t>”, “”) </a:t>
+            </a:r>
+            <a:r>
+              <a:rPr lang="en-US" dirty="0" smtClean="0"/>
+              <a:t>);</a:t>
             </a:r>
           </a:p>
           <a:p>
@@ -18729,7 +18757,7 @@
         </p:spPr>
         <p:txBody>
           <a:bodyPr>
-            <a:normAutofit fontScale="85000" lnSpcReduction="20000"/>
+            <a:normAutofit fontScale="77500" lnSpcReduction="20000"/>
           </a:bodyPr>
           <a:lstStyle/>
           <a:p>
@@ -18759,29 +18787,12 @@
               <a:rPr lang="en-US" dirty="0" smtClean="0"/>
               <a:t>-di; bi-di only</a:t>
             </a:r>
-            <a:endParaRPr lang="en-US" dirty="0" smtClean="0"/>
           </a:p>
           <a:p>
             <a:pPr lvl="1"/>
             <a:r>
               <a:rPr lang="en-US" dirty="0" smtClean="0"/>
-              <a:t>Express </a:t>
-            </a:r>
-            <a:r>
-              <a:rPr lang="en-US" smtClean="0"/>
-              <a:t>bi-di </a:t>
-            </a:r>
-            <a:r>
-              <a:rPr lang="en-US" smtClean="0"/>
-              <a:t>with </a:t>
-            </a:r>
-            <a:r>
-              <a:rPr lang="en-US" smtClean="0"/>
-              <a:t>SQL </a:t>
-            </a:r>
-            <a:r>
-              <a:rPr lang="en-US" dirty="0" smtClean="0"/>
-              <a:t>(often with joins)</a:t>
+              <a:t>Express bi-di with SQL (often with joins)</a:t>
             </a:r>
           </a:p>
           <a:p>
@@ -18796,15 +18807,7 @@
             </a:r>
             <a:r>
               <a:rPr lang="en-US" dirty="0" smtClean="0"/>
-              <a:t> </a:t>
-            </a:r>
-            <a:r>
-              <a:rPr lang="en-US" dirty="0"/>
-              <a:t>= </a:t>
-            </a:r>
-            <a:r>
-              <a:rPr lang="en-US" dirty="0" smtClean="0"/>
-              <a:t>? ”</a:t>
+              <a:t> = ? ”</a:t>
             </a:r>
           </a:p>
           <a:p>
@@ -18816,7 +18819,7 @@
           <a:p>
             <a:r>
               <a:rPr lang="en-US" b="1" dirty="0" smtClean="0"/>
-              <a:t>Three Knobs:</a:t>
+              <a:t>Four Knobs:</a:t>
             </a:r>
           </a:p>
           <a:p>
@@ -18855,6 +18858,42 @@
               <a:rPr lang="en-US" dirty="0" smtClean="0"/>
               <a:t> = CFC Name of the related entity</a:t>
             </a:r>
+          </a:p>
+          <a:p>
+            <a:pPr lvl="1"/>
+            <a:r>
+              <a:rPr lang="en-US" b="1" dirty="0" err="1" smtClean="0"/>
+              <a:t>singularName</a:t>
+            </a:r>
+            <a:r>
+              <a:rPr lang="en-US" dirty="0" smtClean="0"/>
+              <a:t> = how to refer to single members of this collection</a:t>
+            </a:r>
+            <a:endParaRPr lang="en-US" b="1" dirty="0" smtClean="0"/>
+          </a:p>
+          <a:p>
+            <a:r>
+              <a:rPr lang="en-US" dirty="0" smtClean="0"/>
+              <a:t>And one </a:t>
+            </a:r>
+            <a:r>
+              <a:rPr lang="en-US" b="1" dirty="0" smtClean="0"/>
+              <a:t>devil knob named ‘inverse’ </a:t>
+            </a:r>
+            <a:r>
+              <a:rPr lang="en-US" dirty="0" smtClean="0"/>
+              <a:t>to be discussed later</a:t>
+            </a:r>
+            <a:r>
+              <a:rPr lang="en-US" b="1" dirty="0" smtClean="0"/>
+              <a:t>	</a:t>
+            </a:r>
+            <a:endParaRPr lang="en-US" dirty="0" smtClean="0"/>
+          </a:p>
+          <a:p>
+            <a:endParaRPr lang="en-US" b="1" dirty="0"/>
+          </a:p>
+          <a:p>
             <a:endParaRPr lang="en-US" b="1" dirty="0" smtClean="0"/>
           </a:p>
           <a:p>
@@ -19646,7 +19685,7 @@
         </p:spPr>
         <p:txBody>
           <a:bodyPr>
-            <a:normAutofit fontScale="92500" lnSpcReduction="20000"/>
+            <a:normAutofit fontScale="85000" lnSpcReduction="20000"/>
           </a:bodyPr>
           <a:lstStyle/>
           <a:p>
@@ -19724,7 +19763,27 @@
             <a:pPr lvl="1"/>
             <a:r>
               <a:rPr lang="en-US" b="1" dirty="0" smtClean="0"/>
-              <a:t>Then, you simply one-to-many on that Join Entity</a:t>
+              <a:t>Then, you simply one-to-many on that Join </a:t>
+            </a:r>
+            <a:r>
+              <a:rPr lang="en-US" b="1" dirty="0" smtClean="0"/>
+              <a:t>Entity</a:t>
+            </a:r>
+            <a:endParaRPr lang="en-US" b="1" dirty="0" smtClean="0"/>
+          </a:p>
+          <a:p>
+            <a:pPr lvl="1"/>
+            <a:r>
+              <a:rPr lang="en-US" b="1" dirty="0" smtClean="0"/>
+              <a:t>Your “Join Entity” will comprise TWO </a:t>
+            </a:r>
+            <a:r>
+              <a:rPr lang="en-US" b="1" dirty="0" smtClean="0"/>
+              <a:t>many-to-one </a:t>
+            </a:r>
+            <a:r>
+              <a:rPr lang="en-US" b="1" dirty="0" smtClean="0"/>
+              <a:t>relationships</a:t>
             </a:r>
             <a:endParaRPr lang="en-US" b="1" dirty="0"/>
           </a:p>
@@ -20164,22 +20223,22 @@
           <a:p>
             <a:pPr lvl="1"/>
             <a:r>
-              <a:rPr lang="en-US" dirty="0" smtClean="0"/>
-              <a:t> if you plan to add or delete “Collection members”</a:t>
-            </a:r>
-          </a:p>
-          <a:p>
-            <a:pPr lvl="1"/>
-            <a:r>
-              <a:rPr lang="en-US" dirty="0" smtClean="0"/>
-              <a:t>i.e. object1.addObject2( object2 ) ;</a:t>
-            </a:r>
-          </a:p>
-          <a:p>
-            <a:pPr lvl="1"/>
-            <a:r>
               <a:rPr lang="en-US" b="1" dirty="0" smtClean="0"/>
               <a:t>You need inverse=true</a:t>
+            </a:r>
+          </a:p>
+          <a:p>
+            <a:pPr lvl="1"/>
+            <a:r>
+              <a:rPr lang="en-US" b="1" dirty="0" smtClean="0"/>
+              <a:t>Always</a:t>
+            </a:r>
+          </a:p>
+          <a:p>
+            <a:pPr lvl="1"/>
+            <a:r>
+              <a:rPr lang="en-US" b="1" dirty="0" smtClean="0"/>
+              <a:t>No Exceptions</a:t>
             </a:r>
           </a:p>
           <a:p>
@@ -20240,6 +20299,13 @@
   <p:clrMapOvr>
     <a:masterClrMapping/>
   </p:clrMapOvr>
+  <p:timing>
+    <p:tnLst>
+      <p:par>
+        <p:cTn id="1" dur="indefinite" restart="never" nodeType="tmRoot"/>
+      </p:par>
+    </p:tnLst>
+  </p:timing>
 </p:sld>
 </file>
 
@@ -20612,7 +20678,52 @@
           <a:p>
             <a:r>
               <a:rPr lang="en-US" dirty="0" smtClean="0"/>
-              <a:t>Use plain old index loops</a:t>
+              <a:t>Use plain old index </a:t>
+            </a:r>
+            <a:r>
+              <a:rPr lang="en-US" dirty="0" smtClean="0"/>
+              <a:t>loops</a:t>
+            </a:r>
+          </a:p>
+          <a:p>
+            <a:endParaRPr lang="en-US" dirty="0"/>
+          </a:p>
+          <a:p>
+            <a:r>
+              <a:rPr lang="en-US" dirty="0" smtClean="0"/>
+              <a:t>If you use </a:t>
+            </a:r>
+            <a:r>
+              <a:rPr lang="en-US" dirty="0" err="1" smtClean="0"/>
+              <a:t>entityDelete</a:t>
+            </a:r>
+            <a:r>
+              <a:rPr lang="en-US" dirty="0" smtClean="0"/>
+              <a:t>() on a collection item and get “entity would </a:t>
+            </a:r>
+            <a:r>
+              <a:rPr lang="en-US" smtClean="0"/>
+              <a:t>be resaved…”, </a:t>
+            </a:r>
+            <a:r>
+              <a:rPr lang="en-US" dirty="0" smtClean="0"/>
+              <a:t>you must also remove that item from the collection via </a:t>
+            </a:r>
+            <a:r>
+              <a:rPr lang="en-US" dirty="0" err="1" smtClean="0"/>
+              <a:t>removeXXX</a:t>
+            </a:r>
+            <a:r>
+              <a:rPr lang="en-US" dirty="0" smtClean="0"/>
+              <a:t>(XXX) or </a:t>
+            </a:r>
+            <a:r>
+              <a:rPr lang="en-US" dirty="0" err="1" smtClean="0"/>
+              <a:t>arrayDeleteAt</a:t>
+            </a:r>
+            <a:r>
+              <a:rPr lang="en-US" dirty="0" smtClean="0"/>
+              <a:t>(…)</a:t>
             </a:r>
             <a:endParaRPr lang="en-US" dirty="0"/>
           </a:p>
@@ -20660,6 +20771,13 @@
   <p:clrMapOvr>
     <a:masterClrMapping/>
   </p:clrMapOvr>
+  <p:timing>
+    <p:tnLst>
+      <p:par>
+        <p:cTn id="1" dur="indefinite" restart="never" nodeType="tmRoot"/>
+      </p:par>
+    </p:tnLst>
+  </p:timing>
 </p:sld>
 </file>
 
@@ -21206,6 +21324,13 @@
   <p:clrMapOvr>
     <a:masterClrMapping/>
   </p:clrMapOvr>
+  <p:timing>
+    <p:tnLst>
+      <p:par>
+        <p:cTn id="1" dur="indefinite" restart="never" nodeType="tmRoot"/>
+      </p:par>
+    </p:tnLst>
+  </p:timing>
 </p:sld>
 </file>
 
@@ -22047,14 +22172,135 @@
         </p:nvSpPr>
         <p:spPr/>
         <p:txBody>
-          <a:bodyPr/>
+          <a:bodyPr>
+            <a:normAutofit/>
+          </a:bodyPr>
           <a:lstStyle/>
           <a:p>
             <a:r>
-              <a:rPr lang="en-US" dirty="0" smtClean="0"/>
-              <a:t>Links for just about everything I’m showing today will go here</a:t>
-            </a:r>
-            <a:endParaRPr lang="en-US" dirty="0"/>
+              <a:rPr lang="en-US" sz="1400" dirty="0">
+                <a:hlinkClick r:id="rId2"/>
+              </a:rPr>
+              <a:t>http://www.barneyb.com/barneyblog/category/orm</a:t>
+            </a:r>
+            <a:r>
+              <a:rPr lang="en-US" sz="1400" dirty="0" smtClean="0">
+                <a:hlinkClick r:id="rId2"/>
+              </a:rPr>
+              <a:t>/</a:t>
+            </a:r>
+            <a:r>
+              <a:rPr lang="en-US" sz="1400" dirty="0" smtClean="0"/>
+              <a:t> -- transactions, inverse, one-to-many, domain model integrity, </a:t>
+            </a:r>
+            <a:r>
+              <a:rPr lang="en-US" sz="1400" dirty="0" err="1" smtClean="0"/>
+              <a:t>etc</a:t>
+            </a:r>
+            <a:endParaRPr lang="en-US" sz="1400" dirty="0" smtClean="0"/>
+          </a:p>
+          <a:p>
+            <a:r>
+              <a:rPr lang="en-US" sz="1400" dirty="0">
+                <a:hlinkClick r:id="rId3"/>
+              </a:rPr>
+              <a:t>http://</a:t>
+            </a:r>
+            <a:r>
+              <a:rPr lang="en-US" sz="1400" dirty="0" smtClean="0">
+                <a:hlinkClick r:id="rId3"/>
+              </a:rPr>
+              <a:t>www.silverwareconsulting.com/index.cfm/CF-ORM-Integration</a:t>
+            </a:r>
+            <a:r>
+              <a:rPr lang="en-US" sz="1400" dirty="0" smtClean="0"/>
+              <a:t> -- every darn thing</a:t>
+            </a:r>
+          </a:p>
+          <a:p>
+            <a:r>
+              <a:rPr lang="en-US" sz="1400" dirty="0">
+                <a:hlinkClick r:id="rId4"/>
+              </a:rPr>
+              <a:t>http://www.compoundtheory.com/?</a:t>
+            </a:r>
+            <a:r>
+              <a:rPr lang="en-US" sz="1400" dirty="0" smtClean="0">
+                <a:hlinkClick r:id="rId4"/>
+              </a:rPr>
+              <a:t>action=displayPost&amp;ID=419</a:t>
+            </a:r>
+            <a:r>
+              <a:rPr lang="en-US" sz="1400" dirty="0" smtClean="0"/>
+              <a:t> – Hibernate Sessions and Object State</a:t>
+            </a:r>
+          </a:p>
+          <a:p>
+            <a:r>
+              <a:rPr lang="en-US" sz="1400" dirty="0">
+                <a:hlinkClick r:id="rId5"/>
+              </a:rPr>
+              <a:t>http://</a:t>
+            </a:r>
+            <a:r>
+              <a:rPr lang="en-US" sz="1400" dirty="0" smtClean="0">
+                <a:hlinkClick r:id="rId5"/>
+              </a:rPr>
+              <a:t>www.briankotek.com/blog/index.cfm/ObjectRelational-Mapping</a:t>
+            </a:r>
+            <a:r>
+              <a:rPr lang="en-US" sz="1400" dirty="0" smtClean="0"/>
+              <a:t> -- </a:t>
+            </a:r>
+            <a:r>
+              <a:rPr lang="en-US" sz="1400" dirty="0" err="1" smtClean="0"/>
+              <a:t>Bidi</a:t>
+            </a:r>
+            <a:r>
+              <a:rPr lang="en-US" sz="1400" dirty="0" smtClean="0"/>
+              <a:t> relationships, HQL</a:t>
+            </a:r>
+          </a:p>
+          <a:p>
+            <a:r>
+              <a:rPr lang="en-US" sz="1400" dirty="0">
+                <a:hlinkClick r:id="rId6"/>
+              </a:rPr>
+              <a:t>http://www.mkyong.com/hibernate/inverse-true-example-and-explanation</a:t>
+            </a:r>
+            <a:r>
+              <a:rPr lang="en-US" sz="1400" dirty="0" smtClean="0">
+                <a:hlinkClick r:id="rId6"/>
+              </a:rPr>
+              <a:t>/</a:t>
+            </a:r>
+            <a:r>
+              <a:rPr lang="en-US" sz="1400" dirty="0" smtClean="0"/>
+              <a:t> -- inverse=“true” and “relationship owner”</a:t>
+            </a:r>
+          </a:p>
+          <a:p>
+            <a:r>
+              <a:rPr lang="en-US" sz="1400" dirty="0">
+                <a:hlinkClick r:id="rId7"/>
+              </a:rPr>
+              <a:t>http://</a:t>
+            </a:r>
+            <a:r>
+              <a:rPr lang="en-US" sz="1400" dirty="0" smtClean="0">
+                <a:hlinkClick r:id="rId7"/>
+              </a:rPr>
+              <a:t>www.aliaspooryorik.com/blog/index.cfm/category/hibernate-25</a:t>
+            </a:r>
+            <a:r>
+              <a:rPr lang="en-US" sz="1400" dirty="0" smtClean="0"/>
+              <a:t> -- lots of useful tips on HQL, collections, logging</a:t>
+            </a:r>
+            <a:r>
+              <a:rPr lang="en-US" sz="1400" smtClean="0"/>
+              <a:t>, nested-set model, etc.</a:t>
+            </a:r>
+            <a:endParaRPr lang="en-US" sz="1400" dirty="0"/>
           </a:p>
         </p:txBody>
       </p:sp>
@@ -22091,6 +22337,13 @@
   <p:clrMapOvr>
     <a:masterClrMapping/>
   </p:clrMapOvr>
+  <p:timing>
+    <p:tnLst>
+      <p:par>
+        <p:cTn id="1" dur="indefinite" restart="never" nodeType="tmRoot"/>
+      </p:par>
+    </p:tnLst>
+  </p:timing>
 </p:sld>
 </file>
 

</xml_diff>